<commit_message>
env clean-u, cosmetics in presentation
</commit_message>
<xml_diff>
--- a/Investigating periods of increasing interest rates for the S&P 1500.pptx
+++ b/Investigating periods of increasing interest rates for the S&P 1500.pptx
@@ -2853,7 +2853,7 @@
             </a:pPr>
             <a:r>
               <a:rPr lang="de"/>
-              <a:t>Sharpe and </a:t>
+              <a:t>Sharpe, net debt, beta and </a:t>
             </a:r>
             <a:r>
               <a:rPr lang="de"/>
@@ -2981,7 +2981,7 @@
   <p:cSld>
     <p:spTree>
       <p:nvGrpSpPr>
-        <p:cNvPr id="324" name="Shape 324"/>
+        <p:cNvPr id="323" name="Shape 323"/>
         <p:cNvGrpSpPr/>
         <p:nvPr/>
       </p:nvGrpSpPr>
@@ -2995,7 +2995,7 @@
       </p:grpSpPr>
       <p:sp>
         <p:nvSpPr>
-          <p:cNvPr id="325" name="Google Shape;325;g21d059016fe_0_71:notes"/>
+          <p:cNvPr id="324" name="Google Shape;324;g21d059016fe_0_71:notes"/>
           <p:cNvSpPr/>
           <p:nvPr>
             <p:ph idx="2" type="sldImg"/>
@@ -3030,7 +3030,7 @@
       </p:sp>
       <p:sp>
         <p:nvSpPr>
-          <p:cNvPr id="326" name="Google Shape;326;g21d059016fe_0_71:notes"/>
+          <p:cNvPr id="325" name="Google Shape;325;g21d059016fe_0_71:notes"/>
           <p:cNvSpPr txBox="1"/>
           <p:nvPr>
             <p:ph idx="1" type="body"/>
@@ -3179,7 +3179,7 @@
   <p:cSld>
     <p:spTree>
       <p:nvGrpSpPr>
-        <p:cNvPr id="330" name="Shape 330"/>
+        <p:cNvPr id="329" name="Shape 329"/>
         <p:cNvGrpSpPr/>
         <p:nvPr/>
       </p:nvGrpSpPr>
@@ -3193,7 +3193,7 @@
       </p:grpSpPr>
       <p:sp>
         <p:nvSpPr>
-          <p:cNvPr id="331" name="Google Shape;331;g21d059016fe_0_50:notes"/>
+          <p:cNvPr id="330" name="Google Shape;330;g21d059016fe_0_50:notes"/>
           <p:cNvSpPr/>
           <p:nvPr>
             <p:ph idx="2" type="sldImg"/>
@@ -3228,7 +3228,7 @@
       </p:sp>
       <p:sp>
         <p:nvSpPr>
-          <p:cNvPr id="332" name="Google Shape;332;g21d059016fe_0_50:notes"/>
+          <p:cNvPr id="331" name="Google Shape;331;g21d059016fe_0_50:notes"/>
           <p:cNvSpPr txBox="1"/>
           <p:nvPr>
             <p:ph idx="1" type="body"/>
@@ -3278,7 +3278,7 @@
   <p:cSld>
     <p:spTree>
       <p:nvGrpSpPr>
-        <p:cNvPr id="337" name="Shape 337"/>
+        <p:cNvPr id="336" name="Shape 336"/>
         <p:cNvGrpSpPr/>
         <p:nvPr/>
       </p:nvGrpSpPr>
@@ -3292,7 +3292,7 @@
       </p:grpSpPr>
       <p:sp>
         <p:nvSpPr>
-          <p:cNvPr id="338" name="Google Shape;338;g21dfbeba2fa_0_95:notes"/>
+          <p:cNvPr id="337" name="Google Shape;337;g21dfbeba2fa_0_95:notes"/>
           <p:cNvSpPr/>
           <p:nvPr>
             <p:ph idx="2" type="sldImg"/>
@@ -3327,7 +3327,7 @@
       </p:sp>
       <p:sp>
         <p:nvSpPr>
-          <p:cNvPr id="339" name="Google Shape;339;g21dfbeba2fa_0_95:notes"/>
+          <p:cNvPr id="338" name="Google Shape;338;g21dfbeba2fa_0_95:notes"/>
           <p:cNvSpPr txBox="1"/>
           <p:nvPr>
             <p:ph idx="1" type="body"/>
@@ -3377,7 +3377,7 @@
   <p:cSld>
     <p:spTree>
       <p:nvGrpSpPr>
-        <p:cNvPr id="344" name="Shape 344"/>
+        <p:cNvPr id="343" name="Shape 343"/>
         <p:cNvGrpSpPr/>
         <p:nvPr/>
       </p:nvGrpSpPr>
@@ -3391,7 +3391,7 @@
       </p:grpSpPr>
       <p:sp>
         <p:nvSpPr>
-          <p:cNvPr id="345" name="Google Shape;345;g21dfbeba2fa_0_0:notes"/>
+          <p:cNvPr id="344" name="Google Shape;344;g21dfbeba2fa_0_0:notes"/>
           <p:cNvSpPr/>
           <p:nvPr>
             <p:ph idx="2" type="sldImg"/>
@@ -3426,7 +3426,7 @@
       </p:sp>
       <p:sp>
         <p:nvSpPr>
-          <p:cNvPr id="346" name="Google Shape;346;g21dfbeba2fa_0_0:notes"/>
+          <p:cNvPr id="345" name="Google Shape;345;g21dfbeba2fa_0_0:notes"/>
           <p:cNvSpPr txBox="1"/>
           <p:nvPr>
             <p:ph idx="1" type="body"/>
@@ -3476,7 +3476,7 @@
   <p:cSld>
     <p:spTree>
       <p:nvGrpSpPr>
-        <p:cNvPr id="350" name="Shape 350"/>
+        <p:cNvPr id="349" name="Shape 349"/>
         <p:cNvGrpSpPr/>
         <p:nvPr/>
       </p:nvGrpSpPr>
@@ -3490,7 +3490,7 @@
       </p:grpSpPr>
       <p:sp>
         <p:nvSpPr>
-          <p:cNvPr id="351" name="Google Shape;351;g21d059016fe_0_102:notes"/>
+          <p:cNvPr id="350" name="Google Shape;350;g21d059016fe_0_102:notes"/>
           <p:cNvSpPr/>
           <p:nvPr>
             <p:ph idx="2" type="sldImg"/>
@@ -3525,7 +3525,7 @@
       </p:sp>
       <p:sp>
         <p:nvSpPr>
-          <p:cNvPr id="352" name="Google Shape;352;g21d059016fe_0_102:notes"/>
+          <p:cNvPr id="351" name="Google Shape;351;g21d059016fe_0_102:notes"/>
           <p:cNvSpPr txBox="1"/>
           <p:nvPr>
             <p:ph idx="1" type="body"/>
@@ -3575,7 +3575,7 @@
   <p:cSld>
     <p:spTree>
       <p:nvGrpSpPr>
-        <p:cNvPr id="357" name="Shape 357"/>
+        <p:cNvPr id="356" name="Shape 356"/>
         <p:cNvGrpSpPr/>
         <p:nvPr/>
       </p:nvGrpSpPr>
@@ -3589,7 +3589,7 @@
       </p:grpSpPr>
       <p:sp>
         <p:nvSpPr>
-          <p:cNvPr id="358" name="Google Shape;358;g21d059016fe_0_109:notes"/>
+          <p:cNvPr id="357" name="Google Shape;357;g21d059016fe_0_109:notes"/>
           <p:cNvSpPr/>
           <p:nvPr>
             <p:ph idx="2" type="sldImg"/>
@@ -3624,7 +3624,7 @@
       </p:sp>
       <p:sp>
         <p:nvSpPr>
-          <p:cNvPr id="359" name="Google Shape;359;g21d059016fe_0_109:notes"/>
+          <p:cNvPr id="358" name="Google Shape;358;g21d059016fe_0_109:notes"/>
           <p:cNvSpPr txBox="1"/>
           <p:nvPr>
             <p:ph idx="1" type="body"/>
@@ -3674,7 +3674,7 @@
   <p:cSld>
     <p:spTree>
       <p:nvGrpSpPr>
-        <p:cNvPr id="364" name="Shape 364"/>
+        <p:cNvPr id="363" name="Shape 363"/>
         <p:cNvGrpSpPr/>
         <p:nvPr/>
       </p:nvGrpSpPr>
@@ -3688,7 +3688,7 @@
       </p:grpSpPr>
       <p:sp>
         <p:nvSpPr>
-          <p:cNvPr id="365" name="Google Shape;365;g21dfbeba2fa_2_56:notes"/>
+          <p:cNvPr id="364" name="Google Shape;364;g21dfbeba2fa_2_56:notes"/>
           <p:cNvSpPr/>
           <p:nvPr>
             <p:ph idx="2" type="sldImg"/>
@@ -3723,7 +3723,7 @@
       </p:sp>
       <p:sp>
         <p:nvSpPr>
-          <p:cNvPr id="366" name="Google Shape;366;g21dfbeba2fa_2_56:notes"/>
+          <p:cNvPr id="365" name="Google Shape;365;g21dfbeba2fa_2_56:notes"/>
           <p:cNvSpPr txBox="1"/>
           <p:nvPr>
             <p:ph idx="1" type="body"/>
@@ -16413,8 +16413,8 @@
         </p:blipFill>
         <p:spPr>
           <a:xfrm>
-            <a:off x="3313650" y="901825"/>
-            <a:ext cx="5533599" cy="4241674"/>
+            <a:off x="3207050" y="938975"/>
+            <a:ext cx="5633726" cy="4204524"/>
           </a:xfrm>
           <a:prstGeom prst="rect">
             <a:avLst/>
@@ -16549,7 +16549,7 @@
         <p:spPr>
           <a:xfrm>
             <a:off x="870350" y="1221300"/>
-            <a:ext cx="2988600" cy="2672100"/>
+            <a:ext cx="2988600" cy="2902200"/>
           </a:xfrm>
           <a:prstGeom prst="rect">
             <a:avLst/>
@@ -16610,7 +16610,7 @@
                 <a:cs typeface="Lato"/>
                 <a:sym typeface="Lato"/>
               </a:rPr>
-              <a:t>'bootstrap': [True]</a:t>
+              <a:t>'bootstrap': [True], </a:t>
             </a:r>
             <a:endParaRPr sz="1300">
               <a:latin typeface="Lato"/>
@@ -16639,7 +16639,7 @@
                 <a:cs typeface="Lato"/>
                 <a:sym typeface="Lato"/>
               </a:rPr>
-              <a:t>'max_depth': [18]                      'max_features': ['auto']</a:t>
+              <a:t>'max_depth': [17], </a:t>
             </a:r>
             <a:endParaRPr sz="1300">
               <a:latin typeface="Lato"/>
@@ -16668,7 +16668,7 @@
                 <a:cs typeface="Lato"/>
                 <a:sym typeface="Lato"/>
               </a:rPr>
-              <a:t>'max_leaf_nodes': [250]                         'min_samples_leaf': [1]</a:t>
+              <a:t>'max_features': ['auto'], 'max_leaf_nodes': [500],</a:t>
             </a:r>
             <a:endParaRPr sz="1300">
               <a:latin typeface="Lato"/>
@@ -16697,7 +16697,7 @@
                 <a:cs typeface="Lato"/>
                 <a:sym typeface="Lato"/>
               </a:rPr>
-              <a:t>'min_samples_split': [2]                        'n_estimators': [50]</a:t>
+              <a:t>'min_samples_leaf': [5], 'min_samples_split': [5],</a:t>
             </a:r>
             <a:endParaRPr sz="1300">
               <a:latin typeface="Lato"/>
@@ -16717,10 +16717,21 @@
               <a:spcAft>
                 <a:spcPts val="0"/>
               </a:spcAft>
-              <a:buNone/>
-            </a:pPr>
-            <a:r>
-              <a:t/>
+              <a:buClr>
+                <a:schemeClr val="accent4"/>
+              </a:buClr>
+              <a:buSzPts val="1100"/>
+              <a:buFont typeface="Arial"/>
+              <a:buNone/>
+            </a:pPr>
+            <a:r>
+              <a:rPr lang="de" sz="1300">
+                <a:latin typeface="Lato"/>
+                <a:ea typeface="Lato"/>
+                <a:cs typeface="Lato"/>
+                <a:sym typeface="Lato"/>
+              </a:rPr>
+              <a:t>'n_estimators': [50]</a:t>
             </a:r>
             <a:endParaRPr sz="1300">
               <a:latin typeface="Lato"/>
@@ -16731,6 +16742,52 @@
           </a:p>
           <a:p>
             <a:pPr indent="0" lvl="0" marL="0" rtl="0" algn="l">
+              <a:lnSpc>
+                <a:spcPct val="115000"/>
+              </a:lnSpc>
+              <a:spcBef>
+                <a:spcPts val="0"/>
+              </a:spcBef>
+              <a:spcAft>
+                <a:spcPts val="0"/>
+              </a:spcAft>
+              <a:buNone/>
+            </a:pPr>
+            <a:r>
+              <a:t/>
+            </a:r>
+            <a:endParaRPr sz="1300">
+              <a:latin typeface="Lato"/>
+              <a:ea typeface="Lato"/>
+              <a:cs typeface="Lato"/>
+              <a:sym typeface="Lato"/>
+            </a:endParaRPr>
+          </a:p>
+          <a:p>
+            <a:pPr indent="0" lvl="0" marL="0" rtl="0" algn="l">
+              <a:lnSpc>
+                <a:spcPct val="115000"/>
+              </a:lnSpc>
+              <a:spcBef>
+                <a:spcPts val="0"/>
+              </a:spcBef>
+              <a:spcAft>
+                <a:spcPts val="0"/>
+              </a:spcAft>
+              <a:buNone/>
+            </a:pPr>
+            <a:r>
+              <a:t/>
+            </a:r>
+            <a:endParaRPr sz="1300">
+              <a:latin typeface="Lato"/>
+              <a:ea typeface="Lato"/>
+              <a:cs typeface="Lato"/>
+              <a:sym typeface="Lato"/>
+            </a:endParaRPr>
+          </a:p>
+          <a:p>
+            <a:pPr indent="0" lvl="0" marL="0" rtl="0" algn="l">
               <a:spcBef>
                 <a:spcPts val="0"/>
               </a:spcBef>
@@ -16777,18 +16834,17 @@
           <p:cNvPicPr preferRelativeResize="0"/>
           <p:nvPr/>
         </p:nvPicPr>
-        <p:blipFill>
+        <p:blipFill rotWithShape="1">
           <a:blip r:embed="rId4">
             <a:alphaModFix/>
           </a:blip>
-          <a:stretch>
-            <a:fillRect/>
-          </a:stretch>
+          <a:srcRect b="0" l="0" r="34240" t="0"/>
+          <a:stretch/>
         </p:blipFill>
         <p:spPr>
           <a:xfrm>
-            <a:off x="870350" y="3201975"/>
-            <a:ext cx="2327950" cy="1941475"/>
+            <a:off x="870350" y="3140975"/>
+            <a:ext cx="2392200" cy="2002475"/>
           </a:xfrm>
           <a:prstGeom prst="rect">
             <a:avLst/>
@@ -16846,8 +16902,8 @@
         </p:blipFill>
         <p:spPr>
           <a:xfrm>
-            <a:off x="3224550" y="904550"/>
-            <a:ext cx="5604874" cy="4238899"/>
+            <a:off x="3284750" y="939525"/>
+            <a:ext cx="5558700" cy="4203976"/>
           </a:xfrm>
           <a:prstGeom prst="rect">
             <a:avLst/>
@@ -16969,24 +17025,230 @@
           </a:p>
         </p:txBody>
       </p:sp>
+      <p:sp>
+        <p:nvSpPr>
+          <p:cNvPr id="299" name="Google Shape;299;p38"/>
+          <p:cNvSpPr txBox="1"/>
+          <p:nvPr/>
+        </p:nvSpPr>
+        <p:spPr>
+          <a:xfrm>
+            <a:off x="870350" y="1221300"/>
+            <a:ext cx="2076300" cy="2672100"/>
+          </a:xfrm>
+          <a:prstGeom prst="rect">
+            <a:avLst/>
+          </a:prstGeom>
+          <a:noFill/>
+          <a:ln>
+            <a:noFill/>
+          </a:ln>
+        </p:spPr>
+        <p:txBody>
+          <a:bodyPr anchorCtr="0" anchor="t" bIns="91425" lIns="91425" spcFirstLastPara="1" rIns="91425" wrap="square" tIns="91425">
+            <a:spAutoFit/>
+          </a:bodyPr>
+          <a:lstStyle/>
+          <a:p>
+            <a:pPr indent="0" lvl="0" marL="0" rtl="0" algn="l">
+              <a:spcBef>
+                <a:spcPts val="0"/>
+              </a:spcBef>
+              <a:spcAft>
+                <a:spcPts val="0"/>
+              </a:spcAft>
+              <a:buNone/>
+            </a:pPr>
+            <a:r>
+              <a:rPr b="1" lang="de">
+                <a:latin typeface="Lato"/>
+                <a:ea typeface="Lato"/>
+                <a:cs typeface="Lato"/>
+                <a:sym typeface="Lato"/>
+              </a:rPr>
+              <a:t>Parameters:</a:t>
+            </a:r>
+            <a:endParaRPr b="1">
+              <a:latin typeface="Lato"/>
+              <a:ea typeface="Lato"/>
+              <a:cs typeface="Lato"/>
+              <a:sym typeface="Lato"/>
+            </a:endParaRPr>
+          </a:p>
+          <a:p>
+            <a:pPr indent="0" lvl="0" marL="0" rtl="0" algn="l">
+              <a:lnSpc>
+                <a:spcPct val="115000"/>
+              </a:lnSpc>
+              <a:spcBef>
+                <a:spcPts val="0"/>
+              </a:spcBef>
+              <a:spcAft>
+                <a:spcPts val="0"/>
+              </a:spcAft>
+              <a:buNone/>
+            </a:pPr>
+            <a:r>
+              <a:rPr lang="de" sz="1300">
+                <a:latin typeface="Lato"/>
+                <a:ea typeface="Lato"/>
+                <a:cs typeface="Lato"/>
+                <a:sym typeface="Lato"/>
+              </a:rPr>
+              <a:t>'bootstrap': [False], 'max_depth': [9],</a:t>
+            </a:r>
+            <a:endParaRPr sz="1300">
+              <a:latin typeface="Lato"/>
+              <a:ea typeface="Lato"/>
+              <a:cs typeface="Lato"/>
+              <a:sym typeface="Lato"/>
+            </a:endParaRPr>
+          </a:p>
+          <a:p>
+            <a:pPr indent="0" lvl="0" marL="0" rtl="0" algn="l">
+              <a:lnSpc>
+                <a:spcPct val="115000"/>
+              </a:lnSpc>
+              <a:spcBef>
+                <a:spcPts val="0"/>
+              </a:spcBef>
+              <a:spcAft>
+                <a:spcPts val="0"/>
+              </a:spcAft>
+              <a:buNone/>
+            </a:pPr>
+            <a:r>
+              <a:rPr lang="de" sz="1300">
+                <a:latin typeface="Lato"/>
+                <a:ea typeface="Lato"/>
+                <a:cs typeface="Lato"/>
+                <a:sym typeface="Lato"/>
+              </a:rPr>
+              <a:t>'max_features': ['auto'], 'max_leaf_nodes': [500],                         'min_samples_leaf': [5], 'min_samples_split': [5],</a:t>
+            </a:r>
+            <a:endParaRPr sz="1300">
+              <a:latin typeface="Lato"/>
+              <a:ea typeface="Lato"/>
+              <a:cs typeface="Lato"/>
+              <a:sym typeface="Lato"/>
+            </a:endParaRPr>
+          </a:p>
+          <a:p>
+            <a:pPr indent="0" lvl="0" marL="0" rtl="0" algn="l">
+              <a:lnSpc>
+                <a:spcPct val="115000"/>
+              </a:lnSpc>
+              <a:spcBef>
+                <a:spcPts val="0"/>
+              </a:spcBef>
+              <a:spcAft>
+                <a:spcPts val="0"/>
+              </a:spcAft>
+              <a:buClr>
+                <a:schemeClr val="accent4"/>
+              </a:buClr>
+              <a:buSzPts val="1100"/>
+              <a:buFont typeface="Arial"/>
+              <a:buNone/>
+            </a:pPr>
+            <a:r>
+              <a:rPr lang="de" sz="1300">
+                <a:latin typeface="Lato"/>
+                <a:ea typeface="Lato"/>
+                <a:cs typeface="Lato"/>
+                <a:sym typeface="Lato"/>
+              </a:rPr>
+              <a:t>'n_estimators': [50]</a:t>
+            </a:r>
+            <a:endParaRPr sz="1300">
+              <a:latin typeface="Lato"/>
+              <a:ea typeface="Lato"/>
+              <a:cs typeface="Lato"/>
+              <a:sym typeface="Lato"/>
+            </a:endParaRPr>
+          </a:p>
+          <a:p>
+            <a:pPr indent="0" lvl="0" marL="0" rtl="0" algn="l">
+              <a:lnSpc>
+                <a:spcPct val="115000"/>
+              </a:lnSpc>
+              <a:spcBef>
+                <a:spcPts val="0"/>
+              </a:spcBef>
+              <a:spcAft>
+                <a:spcPts val="0"/>
+              </a:spcAft>
+              <a:buNone/>
+            </a:pPr>
+            <a:r>
+              <a:t/>
+            </a:r>
+            <a:endParaRPr sz="1300">
+              <a:latin typeface="Lato"/>
+              <a:ea typeface="Lato"/>
+              <a:cs typeface="Lato"/>
+              <a:sym typeface="Lato"/>
+            </a:endParaRPr>
+          </a:p>
+          <a:p>
+            <a:pPr indent="0" lvl="0" marL="0" rtl="0" algn="l">
+              <a:spcBef>
+                <a:spcPts val="0"/>
+              </a:spcBef>
+              <a:spcAft>
+                <a:spcPts val="0"/>
+              </a:spcAft>
+              <a:buNone/>
+            </a:pPr>
+            <a:r>
+              <a:t/>
+            </a:r>
+            <a:endParaRPr>
+              <a:latin typeface="Lato"/>
+              <a:ea typeface="Lato"/>
+              <a:cs typeface="Lato"/>
+              <a:sym typeface="Lato"/>
+            </a:endParaRPr>
+          </a:p>
+          <a:p>
+            <a:pPr indent="0" lvl="0" marL="0" rtl="0" algn="l">
+              <a:spcBef>
+                <a:spcPts val="0"/>
+              </a:spcBef>
+              <a:spcAft>
+                <a:spcPts val="0"/>
+              </a:spcAft>
+              <a:buNone/>
+            </a:pPr>
+            <a:r>
+              <a:t/>
+            </a:r>
+            <a:endParaRPr b="1">
+              <a:latin typeface="Lato"/>
+              <a:ea typeface="Lato"/>
+              <a:cs typeface="Lato"/>
+              <a:sym typeface="Lato"/>
+            </a:endParaRPr>
+          </a:p>
+        </p:txBody>
+      </p:sp>
       <p:pic>
         <p:nvPicPr>
-          <p:cNvPr id="299" name="Google Shape;299;p38"/>
+          <p:cNvPr id="300" name="Google Shape;300;p38"/>
           <p:cNvPicPr preferRelativeResize="0"/>
           <p:nvPr/>
         </p:nvPicPr>
-        <p:blipFill>
+        <p:blipFill rotWithShape="1">
           <a:blip r:embed="rId4">
             <a:alphaModFix/>
           </a:blip>
-          <a:stretch>
-            <a:fillRect/>
-          </a:stretch>
+          <a:srcRect b="0" l="0" r="34145" t="0"/>
+          <a:stretch/>
         </p:blipFill>
         <p:spPr>
           <a:xfrm>
-            <a:off x="870350" y="3198300"/>
-            <a:ext cx="2354200" cy="1945150"/>
+            <a:off x="870350" y="3127625"/>
+            <a:ext cx="2414400" cy="2015825"/>
           </a:xfrm>
           <a:prstGeom prst="rect">
             <a:avLst/>
@@ -17003,243 +17265,6 @@
           </a:ln>
         </p:spPr>
       </p:pic>
-      <p:sp>
-        <p:nvSpPr>
-          <p:cNvPr id="300" name="Google Shape;300;p38"/>
-          <p:cNvSpPr txBox="1"/>
-          <p:nvPr/>
-        </p:nvSpPr>
-        <p:spPr>
-          <a:xfrm>
-            <a:off x="870350" y="1221300"/>
-            <a:ext cx="2076300" cy="2442000"/>
-          </a:xfrm>
-          <a:prstGeom prst="rect">
-            <a:avLst/>
-          </a:prstGeom>
-          <a:noFill/>
-          <a:ln>
-            <a:noFill/>
-          </a:ln>
-        </p:spPr>
-        <p:txBody>
-          <a:bodyPr anchorCtr="0" anchor="t" bIns="91425" lIns="91425" spcFirstLastPara="1" rIns="91425" wrap="square" tIns="91425">
-            <a:spAutoFit/>
-          </a:bodyPr>
-          <a:lstStyle/>
-          <a:p>
-            <a:pPr indent="0" lvl="0" marL="0" rtl="0" algn="l">
-              <a:spcBef>
-                <a:spcPts val="0"/>
-              </a:spcBef>
-              <a:spcAft>
-                <a:spcPts val="0"/>
-              </a:spcAft>
-              <a:buNone/>
-            </a:pPr>
-            <a:r>
-              <a:rPr b="1" lang="de">
-                <a:latin typeface="Lato"/>
-                <a:ea typeface="Lato"/>
-                <a:cs typeface="Lato"/>
-                <a:sym typeface="Lato"/>
-              </a:rPr>
-              <a:t>Parameters:</a:t>
-            </a:r>
-            <a:endParaRPr b="1">
-              <a:latin typeface="Lato"/>
-              <a:ea typeface="Lato"/>
-              <a:cs typeface="Lato"/>
-              <a:sym typeface="Lato"/>
-            </a:endParaRPr>
-          </a:p>
-          <a:p>
-            <a:pPr indent="0" lvl="0" marL="0" rtl="0" algn="l">
-              <a:lnSpc>
-                <a:spcPct val="115000"/>
-              </a:lnSpc>
-              <a:spcBef>
-                <a:spcPts val="0"/>
-              </a:spcBef>
-              <a:spcAft>
-                <a:spcPts val="0"/>
-              </a:spcAft>
-              <a:buNone/>
-            </a:pPr>
-            <a:r>
-              <a:rPr lang="de" sz="1300">
-                <a:latin typeface="Lato"/>
-                <a:ea typeface="Lato"/>
-                <a:cs typeface="Lato"/>
-                <a:sym typeface="Lato"/>
-              </a:rPr>
-              <a:t>'bootstrap': [False]</a:t>
-            </a:r>
-            <a:endParaRPr sz="1300">
-              <a:latin typeface="Lato"/>
-              <a:ea typeface="Lato"/>
-              <a:cs typeface="Lato"/>
-              <a:sym typeface="Lato"/>
-            </a:endParaRPr>
-          </a:p>
-          <a:p>
-            <a:pPr indent="0" lvl="0" marL="0" rtl="0" algn="l">
-              <a:lnSpc>
-                <a:spcPct val="115000"/>
-              </a:lnSpc>
-              <a:spcBef>
-                <a:spcPts val="0"/>
-              </a:spcBef>
-              <a:spcAft>
-                <a:spcPts val="0"/>
-              </a:spcAft>
-              <a:buNone/>
-            </a:pPr>
-            <a:r>
-              <a:rPr lang="de" sz="1300">
-                <a:latin typeface="Lato"/>
-                <a:ea typeface="Lato"/>
-                <a:cs typeface="Lato"/>
-                <a:sym typeface="Lato"/>
-              </a:rPr>
-              <a:t>'max_depth': [11]</a:t>
-            </a:r>
-            <a:endParaRPr sz="1300">
-              <a:latin typeface="Lato"/>
-              <a:ea typeface="Lato"/>
-              <a:cs typeface="Lato"/>
-              <a:sym typeface="Lato"/>
-            </a:endParaRPr>
-          </a:p>
-          <a:p>
-            <a:pPr indent="0" lvl="0" marL="0" rtl="0" algn="l">
-              <a:lnSpc>
-                <a:spcPct val="115000"/>
-              </a:lnSpc>
-              <a:spcBef>
-                <a:spcPts val="0"/>
-              </a:spcBef>
-              <a:spcAft>
-                <a:spcPts val="0"/>
-              </a:spcAft>
-              <a:buNone/>
-            </a:pPr>
-            <a:r>
-              <a:rPr lang="de" sz="1300">
-                <a:latin typeface="Lato"/>
-                <a:ea typeface="Lato"/>
-                <a:cs typeface="Lato"/>
-                <a:sym typeface="Lato"/>
-              </a:rPr>
-              <a:t>'max_features': ['auto']</a:t>
-            </a:r>
-            <a:endParaRPr sz="1300">
-              <a:latin typeface="Lato"/>
-              <a:ea typeface="Lato"/>
-              <a:cs typeface="Lato"/>
-              <a:sym typeface="Lato"/>
-            </a:endParaRPr>
-          </a:p>
-          <a:p>
-            <a:pPr indent="0" lvl="0" marL="0" rtl="0" algn="l">
-              <a:lnSpc>
-                <a:spcPct val="115000"/>
-              </a:lnSpc>
-              <a:spcBef>
-                <a:spcPts val="0"/>
-              </a:spcBef>
-              <a:spcAft>
-                <a:spcPts val="0"/>
-              </a:spcAft>
-              <a:buNone/>
-            </a:pPr>
-            <a:r>
-              <a:rPr lang="de" sz="1300">
-                <a:latin typeface="Lato"/>
-                <a:ea typeface="Lato"/>
-                <a:cs typeface="Lato"/>
-                <a:sym typeface="Lato"/>
-              </a:rPr>
-              <a:t>'max_leaf_nodes': [250]                         'min_samples_leaf': [5]</a:t>
-            </a:r>
-            <a:endParaRPr sz="1300">
-              <a:latin typeface="Lato"/>
-              <a:ea typeface="Lato"/>
-              <a:cs typeface="Lato"/>
-              <a:sym typeface="Lato"/>
-            </a:endParaRPr>
-          </a:p>
-          <a:p>
-            <a:pPr indent="0" lvl="0" marL="0" rtl="0" algn="l">
-              <a:lnSpc>
-                <a:spcPct val="115000"/>
-              </a:lnSpc>
-              <a:spcBef>
-                <a:spcPts val="0"/>
-              </a:spcBef>
-              <a:spcAft>
-                <a:spcPts val="0"/>
-              </a:spcAft>
-              <a:buNone/>
-            </a:pPr>
-            <a:r>
-              <a:rPr lang="de" sz="1300">
-                <a:latin typeface="Lato"/>
-                <a:ea typeface="Lato"/>
-                <a:cs typeface="Lato"/>
-                <a:sym typeface="Lato"/>
-              </a:rPr>
-              <a:t>'min_samples_split': [5]                         'n_estimators': [50]</a:t>
-            </a:r>
-            <a:endParaRPr sz="1300">
-              <a:latin typeface="Lato"/>
-              <a:ea typeface="Lato"/>
-              <a:cs typeface="Lato"/>
-              <a:sym typeface="Lato"/>
-            </a:endParaRPr>
-          </a:p>
-          <a:p>
-            <a:pPr indent="0" lvl="0" marL="0" rtl="0" algn="l">
-              <a:spcBef>
-                <a:spcPts val="0"/>
-              </a:spcBef>
-              <a:spcAft>
-                <a:spcPts val="0"/>
-              </a:spcAft>
-              <a:buNone/>
-            </a:pPr>
-            <a:r>
-              <a:t/>
-            </a:r>
-            <a:endParaRPr>
-              <a:latin typeface="Lato"/>
-              <a:ea typeface="Lato"/>
-              <a:cs typeface="Lato"/>
-              <a:sym typeface="Lato"/>
-            </a:endParaRPr>
-          </a:p>
-          <a:p>
-            <a:pPr indent="0" lvl="0" marL="0" rtl="0" algn="l">
-              <a:spcBef>
-                <a:spcPts val="0"/>
-              </a:spcBef>
-              <a:spcAft>
-                <a:spcPts val="0"/>
-              </a:spcAft>
-              <a:buNone/>
-            </a:pPr>
-            <a:r>
-              <a:t/>
-            </a:r>
-            <a:endParaRPr b="1">
-              <a:latin typeface="Lato"/>
-              <a:ea typeface="Lato"/>
-              <a:cs typeface="Lato"/>
-              <a:sym typeface="Lato"/>
-            </a:endParaRPr>
-          </a:p>
-        </p:txBody>
-      </p:sp>
     </p:spTree>
   </p:cSld>
   <p:clrMapOvr>
@@ -17281,8 +17306,8 @@
         </p:blipFill>
         <p:spPr>
           <a:xfrm>
-            <a:off x="3271700" y="924359"/>
-            <a:ext cx="5578674" cy="4219092"/>
+            <a:off x="3273650" y="936925"/>
+            <a:ext cx="5562125" cy="4206576"/>
           </a:xfrm>
           <a:prstGeom prst="rect">
             <a:avLst/>
@@ -17421,7 +17446,7 @@
         <p:spPr>
           <a:xfrm>
             <a:off x="870350" y="1221300"/>
-            <a:ext cx="2988600" cy="2226600"/>
+            <a:ext cx="2988600" cy="2456700"/>
           </a:xfrm>
           <a:prstGeom prst="rect">
             <a:avLst/>
@@ -17482,7 +17507,7 @@
                 <a:cs typeface="Lato"/>
                 <a:sym typeface="Lato"/>
               </a:rPr>
-              <a:t>'bootstrap': [True]</a:t>
+              <a:t>'bootstrap': [False],</a:t>
             </a:r>
             <a:endParaRPr sz="1300">
               <a:latin typeface="Lato"/>
@@ -17511,7 +17536,7 @@
                 <a:cs typeface="Lato"/>
                 <a:sym typeface="Lato"/>
               </a:rPr>
-              <a:t>'max_depth': [2]</a:t>
+              <a:t>'max_depth': [2],</a:t>
             </a:r>
             <a:endParaRPr sz="1300">
               <a:latin typeface="Lato"/>
@@ -17540,7 +17565,7 @@
                 <a:cs typeface="Lato"/>
                 <a:sym typeface="Lato"/>
               </a:rPr>
-              <a:t>'max_features': ['auto']</a:t>
+              <a:t>'max_features': ['auto'], 'max_leaf_nodes': [500],</a:t>
             </a:r>
             <a:endParaRPr sz="1300">
               <a:latin typeface="Lato"/>
@@ -17569,7 +17594,7 @@
                 <a:cs typeface="Lato"/>
                 <a:sym typeface="Lato"/>
               </a:rPr>
-              <a:t>'max_leaf_nodes': [250]</a:t>
+              <a:t>'min_samples_leaf': [50], 'min_samples_split': [25],</a:t>
             </a:r>
             <a:endParaRPr sz="1300">
               <a:latin typeface="Lato"/>
@@ -17589,64 +17614,11 @@
               <a:spcAft>
                 <a:spcPts val="0"/>
               </a:spcAft>
-              <a:buNone/>
-            </a:pPr>
-            <a:r>
-              <a:rPr lang="de" sz="1300">
-                <a:latin typeface="Lato"/>
-                <a:ea typeface="Lato"/>
-                <a:cs typeface="Lato"/>
-                <a:sym typeface="Lato"/>
-              </a:rPr>
-              <a:t>'min_samples_leaf': [5]</a:t>
-            </a:r>
-            <a:endParaRPr sz="1300">
-              <a:latin typeface="Lato"/>
-              <a:ea typeface="Lato"/>
-              <a:cs typeface="Lato"/>
-              <a:sym typeface="Lato"/>
-            </a:endParaRPr>
-          </a:p>
-          <a:p>
-            <a:pPr indent="0" lvl="0" marL="0" rtl="0" algn="l">
-              <a:lnSpc>
-                <a:spcPct val="115000"/>
-              </a:lnSpc>
-              <a:spcBef>
-                <a:spcPts val="0"/>
-              </a:spcBef>
-              <a:spcAft>
-                <a:spcPts val="0"/>
-              </a:spcAft>
-              <a:buNone/>
-            </a:pPr>
-            <a:r>
-              <a:rPr lang="de" sz="1300">
-                <a:latin typeface="Lato"/>
-                <a:ea typeface="Lato"/>
-                <a:cs typeface="Lato"/>
-                <a:sym typeface="Lato"/>
-              </a:rPr>
-              <a:t>'min_samples_split': [25]</a:t>
-            </a:r>
-            <a:endParaRPr sz="1300">
-              <a:latin typeface="Lato"/>
-              <a:ea typeface="Lato"/>
-              <a:cs typeface="Lato"/>
-              <a:sym typeface="Lato"/>
-            </a:endParaRPr>
-          </a:p>
-          <a:p>
-            <a:pPr indent="0" lvl="0" marL="0" rtl="0" algn="l">
-              <a:lnSpc>
-                <a:spcPct val="115000"/>
-              </a:lnSpc>
-              <a:spcBef>
-                <a:spcPts val="0"/>
-              </a:spcBef>
-              <a:spcAft>
-                <a:spcPts val="0"/>
-              </a:spcAft>
+              <a:buClr>
+                <a:schemeClr val="accent4"/>
+              </a:buClr>
+              <a:buSzPts val="1100"/>
+              <a:buFont typeface="Arial"/>
               <a:buNone/>
             </a:pPr>
             <a:r>
@@ -17667,6 +17639,29 @@
           </a:p>
           <a:p>
             <a:pPr indent="0" lvl="0" marL="0" rtl="0" algn="l">
+              <a:lnSpc>
+                <a:spcPct val="115000"/>
+              </a:lnSpc>
+              <a:spcBef>
+                <a:spcPts val="0"/>
+              </a:spcBef>
+              <a:spcAft>
+                <a:spcPts val="0"/>
+              </a:spcAft>
+              <a:buNone/>
+            </a:pPr>
+            <a:r>
+              <a:t/>
+            </a:r>
+            <a:endParaRPr sz="1300">
+              <a:latin typeface="Lato"/>
+              <a:ea typeface="Lato"/>
+              <a:cs typeface="Lato"/>
+              <a:sym typeface="Lato"/>
+            </a:endParaRPr>
+          </a:p>
+          <a:p>
+            <a:pPr indent="0" lvl="0" marL="0" rtl="0" algn="l">
               <a:spcBef>
                 <a:spcPts val="0"/>
               </a:spcBef>
@@ -17693,18 +17688,17 @@
           <p:cNvPicPr preferRelativeResize="0"/>
           <p:nvPr/>
         </p:nvPicPr>
-        <p:blipFill>
+        <p:blipFill rotWithShape="1">
           <a:blip r:embed="rId4">
             <a:alphaModFix/>
           </a:blip>
-          <a:stretch>
-            <a:fillRect/>
-          </a:stretch>
+          <a:srcRect b="0" l="0" r="34486" t="0"/>
+          <a:stretch/>
         </p:blipFill>
         <p:spPr>
           <a:xfrm>
-            <a:off x="870350" y="3200500"/>
-            <a:ext cx="2327950" cy="1942950"/>
+            <a:off x="870350" y="3131457"/>
+            <a:ext cx="2403300" cy="2012043"/>
           </a:xfrm>
           <a:prstGeom prst="rect">
             <a:avLst/>
@@ -17756,13 +17750,13 @@
           <a:blip r:embed="rId3">
             <a:alphaModFix/>
           </a:blip>
-          <a:srcRect b="0" l="0" r="68070" t="0"/>
+          <a:srcRect b="0" l="0" r="77477" t="0"/>
           <a:stretch/>
         </p:blipFill>
         <p:spPr>
           <a:xfrm>
-            <a:off x="593775" y="3214250"/>
-            <a:ext cx="4022764" cy="1580825"/>
+            <a:off x="1098850" y="3220475"/>
+            <a:ext cx="2781866" cy="1529375"/>
           </a:xfrm>
           <a:prstGeom prst="rect">
             <a:avLst/>
@@ -17780,16 +17774,16 @@
           <p:nvPr/>
         </p:nvPicPr>
         <p:blipFill rotWithShape="1">
-          <a:blip r:embed="rId4">
+          <a:blip r:embed="rId3">
             <a:alphaModFix/>
           </a:blip>
-          <a:srcRect b="0" l="69247" r="0" t="0"/>
+          <a:srcRect b="0" l="62425" r="0" t="0"/>
           <a:stretch/>
         </p:blipFill>
         <p:spPr>
           <a:xfrm>
-            <a:off x="4616550" y="3214250"/>
-            <a:ext cx="3927247" cy="1602300"/>
+            <a:off x="3859025" y="3220475"/>
+            <a:ext cx="4641012" cy="1529375"/>
           </a:xfrm>
           <a:prstGeom prst="rect">
             <a:avLst/>
@@ -17800,9 +17794,36 @@
           </a:ln>
         </p:spPr>
       </p:pic>
-      <p:sp>
-        <p:nvSpPr>
+      <p:pic>
+        <p:nvPicPr>
           <p:cNvPr id="316" name="Google Shape;316;p40"/>
+          <p:cNvPicPr preferRelativeResize="0"/>
+          <p:nvPr/>
+        </p:nvPicPr>
+        <p:blipFill rotWithShape="1">
+          <a:blip r:embed="rId3">
+            <a:alphaModFix/>
+          </a:blip>
+          <a:srcRect b="0" l="0" r="37865" t="0"/>
+          <a:stretch/>
+        </p:blipFill>
+        <p:spPr>
+          <a:xfrm>
+            <a:off x="1098856" y="1439550"/>
+            <a:ext cx="7614995" cy="1517450"/>
+          </a:xfrm>
+          <a:prstGeom prst="rect">
+            <a:avLst/>
+          </a:prstGeom>
+          <a:noFill/>
+          <a:ln>
+            <a:noFill/>
+          </a:ln>
+        </p:spPr>
+      </p:pic>
+      <p:sp>
+        <p:nvSpPr>
+          <p:cNvPr id="317" name="Google Shape;317;p40"/>
           <p:cNvSpPr txBox="1"/>
           <p:nvPr>
             <p:ph type="title"/>
@@ -17873,7 +17894,7 @@
       </p:sp>
       <p:sp>
         <p:nvSpPr>
-          <p:cNvPr id="317" name="Google Shape;317;p40"/>
+          <p:cNvPr id="318" name="Google Shape;318;p40"/>
           <p:cNvSpPr txBox="1"/>
           <p:nvPr>
             <p:ph idx="12" type="sldNum"/>
@@ -17921,60 +17942,14 @@
       </p:sp>
       <p:sp>
         <p:nvSpPr>
-          <p:cNvPr id="318" name="Google Shape;318;p40"/>
-          <p:cNvSpPr txBox="1"/>
-          <p:nvPr/>
-        </p:nvSpPr>
-        <p:spPr>
-          <a:xfrm>
-            <a:off x="674700" y="1475650"/>
-            <a:ext cx="7794600" cy="400200"/>
-          </a:xfrm>
-          <a:prstGeom prst="rect">
-            <a:avLst/>
-          </a:prstGeom>
-          <a:noFill/>
-          <a:ln>
-            <a:noFill/>
-          </a:ln>
-        </p:spPr>
-        <p:txBody>
-          <a:bodyPr anchorCtr="0" anchor="t" bIns="91425" lIns="91425" spcFirstLastPara="1" rIns="91425" wrap="square" tIns="91425">
-            <a:spAutoFit/>
-          </a:bodyPr>
-          <a:lstStyle/>
-          <a:p>
-            <a:pPr indent="0" lvl="0" marL="0" rtl="0" algn="l">
-              <a:spcBef>
-                <a:spcPts val="0"/>
-              </a:spcBef>
-              <a:spcAft>
-                <a:spcPts val="0"/>
-              </a:spcAft>
-              <a:buNone/>
-            </a:pPr>
-            <a:r>
-              <a:t/>
-            </a:r>
-            <a:endParaRPr>
-              <a:latin typeface="Lato"/>
-              <a:ea typeface="Lato"/>
-              <a:cs typeface="Lato"/>
-              <a:sym typeface="Lato"/>
-            </a:endParaRPr>
-          </a:p>
-        </p:txBody>
-      </p:sp>
-      <p:sp>
-        <p:nvSpPr>
           <p:cNvPr id="319" name="Google Shape;319;p40"/>
           <p:cNvSpPr/>
           <p:nvPr/>
         </p:nvSpPr>
         <p:spPr>
           <a:xfrm>
-            <a:off x="4669050" y="4561800"/>
-            <a:ext cx="813900" cy="337500"/>
+            <a:off x="4724525" y="4561725"/>
+            <a:ext cx="813900" cy="276600"/>
           </a:xfrm>
           <a:prstGeom prst="rect">
             <a:avLst/>
@@ -18012,43 +17987,16 @@
           </a:p>
         </p:txBody>
       </p:sp>
-      <p:pic>
-        <p:nvPicPr>
+      <p:sp>
+        <p:nvSpPr>
           <p:cNvPr id="320" name="Google Shape;320;p40"/>
-          <p:cNvPicPr preferRelativeResize="0"/>
-          <p:nvPr/>
-        </p:nvPicPr>
-        <p:blipFill rotWithShape="1">
-          <a:blip r:embed="rId3">
-            <a:alphaModFix/>
-          </a:blip>
-          <a:srcRect b="0" l="0" r="30536" t="0"/>
-          <a:stretch/>
-        </p:blipFill>
-        <p:spPr>
-          <a:xfrm>
-            <a:off x="393300" y="1363849"/>
-            <a:ext cx="8357400" cy="1509558"/>
-          </a:xfrm>
-          <a:prstGeom prst="rect">
-            <a:avLst/>
-          </a:prstGeom>
-          <a:noFill/>
-          <a:ln>
-            <a:noFill/>
-          </a:ln>
-        </p:spPr>
-      </p:pic>
-      <p:sp>
-        <p:nvSpPr>
-          <p:cNvPr id="321" name="Google Shape;321;p40"/>
           <p:cNvSpPr/>
           <p:nvPr/>
         </p:nvSpPr>
         <p:spPr>
           <a:xfrm>
-            <a:off x="7885650" y="1653500"/>
-            <a:ext cx="865200" cy="1303500"/>
+            <a:off x="7885650" y="1753350"/>
+            <a:ext cx="813900" cy="1298400"/>
           </a:xfrm>
           <a:prstGeom prst="rect">
             <a:avLst/>
@@ -18088,7 +18036,7 @@
       </p:sp>
       <p:sp>
         <p:nvSpPr>
-          <p:cNvPr id="322" name="Google Shape;322;p40"/>
+          <p:cNvPr id="321" name="Google Shape;321;p40"/>
           <p:cNvSpPr/>
           <p:nvPr/>
         </p:nvSpPr>
@@ -18135,7 +18083,7 @@
       </p:sp>
       <p:sp>
         <p:nvSpPr>
-          <p:cNvPr id="323" name="Google Shape;323;p40"/>
+          <p:cNvPr id="322" name="Google Shape;322;p40"/>
           <p:cNvSpPr/>
           <p:nvPr/>
         </p:nvSpPr>
@@ -18193,7 +18141,7 @@
   <p:cSld>
     <p:spTree>
       <p:nvGrpSpPr>
-        <p:cNvPr id="327" name="Shape 327"/>
+        <p:cNvPr id="326" name="Shape 326"/>
         <p:cNvGrpSpPr/>
         <p:nvPr/>
       </p:nvGrpSpPr>
@@ -18207,7 +18155,7 @@
       </p:grpSpPr>
       <p:sp>
         <p:nvSpPr>
-          <p:cNvPr id="328" name="Google Shape;328;p41"/>
+          <p:cNvPr id="327" name="Google Shape;327;p41"/>
           <p:cNvSpPr txBox="1"/>
           <p:nvPr>
             <p:ph type="title"/>
@@ -18247,7 +18195,7 @@
       </p:sp>
       <p:sp>
         <p:nvSpPr>
-          <p:cNvPr id="329" name="Google Shape;329;p41"/>
+          <p:cNvPr id="328" name="Google Shape;328;p41"/>
           <p:cNvSpPr txBox="1"/>
           <p:nvPr>
             <p:ph idx="12" type="sldNum"/>
@@ -18404,7 +18352,7 @@
   <p:cSld>
     <p:spTree>
       <p:nvGrpSpPr>
-        <p:cNvPr id="333" name="Shape 333"/>
+        <p:cNvPr id="332" name="Shape 332"/>
         <p:cNvGrpSpPr/>
         <p:nvPr/>
       </p:nvGrpSpPr>
@@ -18418,7 +18366,7 @@
       </p:grpSpPr>
       <p:sp>
         <p:nvSpPr>
-          <p:cNvPr id="334" name="Google Shape;334;p42"/>
+          <p:cNvPr id="333" name="Google Shape;333;p42"/>
           <p:cNvSpPr txBox="1"/>
           <p:nvPr>
             <p:ph type="title"/>
@@ -18458,7 +18406,7 @@
       </p:sp>
       <p:sp>
         <p:nvSpPr>
-          <p:cNvPr id="335" name="Google Shape;335;p42"/>
+          <p:cNvPr id="334" name="Google Shape;334;p42"/>
           <p:cNvSpPr txBox="1"/>
           <p:nvPr>
             <p:ph idx="12" type="sldNum"/>
@@ -18498,7 +18446,7 @@
       </p:sp>
       <p:sp>
         <p:nvSpPr>
-          <p:cNvPr id="336" name="Google Shape;336;p42"/>
+          <p:cNvPr id="335" name="Google Shape;335;p42"/>
           <p:cNvSpPr txBox="1"/>
           <p:nvPr>
             <p:ph idx="1" type="body"/>
@@ -18690,7 +18638,7 @@
   <p:cSld>
     <p:spTree>
       <p:nvGrpSpPr>
-        <p:cNvPr id="340" name="Shape 340"/>
+        <p:cNvPr id="339" name="Shape 339"/>
         <p:cNvGrpSpPr/>
         <p:nvPr/>
       </p:nvGrpSpPr>
@@ -18704,7 +18652,7 @@
       </p:grpSpPr>
       <p:sp>
         <p:nvSpPr>
-          <p:cNvPr id="341" name="Google Shape;341;p43"/>
+          <p:cNvPr id="340" name="Google Shape;340;p43"/>
           <p:cNvSpPr txBox="1"/>
           <p:nvPr>
             <p:ph type="title"/>
@@ -18744,7 +18692,7 @@
       </p:sp>
       <p:sp>
         <p:nvSpPr>
-          <p:cNvPr id="342" name="Google Shape;342;p43"/>
+          <p:cNvPr id="341" name="Google Shape;341;p43"/>
           <p:cNvSpPr txBox="1"/>
           <p:nvPr>
             <p:ph idx="12" type="sldNum"/>
@@ -18784,7 +18732,7 @@
       </p:sp>
       <p:sp>
         <p:nvSpPr>
-          <p:cNvPr id="343" name="Google Shape;343;p43"/>
+          <p:cNvPr id="342" name="Google Shape;342;p43"/>
           <p:cNvSpPr txBox="1"/>
           <p:nvPr>
             <p:ph idx="1" type="body"/>
@@ -18927,7 +18875,7 @@
   <p:cSld>
     <p:spTree>
       <p:nvGrpSpPr>
-        <p:cNvPr id="347" name="Shape 347"/>
+        <p:cNvPr id="346" name="Shape 346"/>
         <p:cNvGrpSpPr/>
         <p:nvPr/>
       </p:nvGrpSpPr>
@@ -18941,7 +18889,7 @@
       </p:grpSpPr>
       <p:sp>
         <p:nvSpPr>
-          <p:cNvPr id="348" name="Google Shape;348;p44"/>
+          <p:cNvPr id="347" name="Google Shape;347;p44"/>
           <p:cNvSpPr txBox="1"/>
           <p:nvPr>
             <p:ph type="title"/>
@@ -18985,7 +18933,7 @@
       </p:sp>
       <p:sp>
         <p:nvSpPr>
-          <p:cNvPr id="349" name="Google Shape;349;p44"/>
+          <p:cNvPr id="348" name="Google Shape;348;p44"/>
           <p:cNvSpPr txBox="1"/>
           <p:nvPr>
             <p:ph idx="12" type="sldNum"/>
@@ -19036,7 +18984,7 @@
   <p:cSld>
     <p:spTree>
       <p:nvGrpSpPr>
-        <p:cNvPr id="353" name="Shape 353"/>
+        <p:cNvPr id="352" name="Shape 352"/>
         <p:cNvGrpSpPr/>
         <p:nvPr/>
       </p:nvGrpSpPr>
@@ -19050,7 +18998,7 @@
       </p:grpSpPr>
       <p:sp>
         <p:nvSpPr>
-          <p:cNvPr id="354" name="Google Shape;354;p45"/>
+          <p:cNvPr id="353" name="Google Shape;353;p45"/>
           <p:cNvSpPr txBox="1"/>
           <p:nvPr>
             <p:ph type="title"/>
@@ -19094,7 +19042,7 @@
       </p:sp>
       <p:sp>
         <p:nvSpPr>
-          <p:cNvPr id="355" name="Google Shape;355;p45"/>
+          <p:cNvPr id="354" name="Google Shape;354;p45"/>
           <p:cNvSpPr txBox="1"/>
           <p:nvPr>
             <p:ph idx="12" type="sldNum"/>
@@ -19134,7 +19082,7 @@
       </p:sp>
       <p:sp>
         <p:nvSpPr>
-          <p:cNvPr id="356" name="Google Shape;356;p45"/>
+          <p:cNvPr id="355" name="Google Shape;355;p45"/>
           <p:cNvSpPr txBox="1"/>
           <p:nvPr>
             <p:ph idx="1" type="body"/>
@@ -19302,7 +19250,7 @@
   <p:cSld>
     <p:spTree>
       <p:nvGrpSpPr>
-        <p:cNvPr id="360" name="Shape 360"/>
+        <p:cNvPr id="359" name="Shape 359"/>
         <p:cNvGrpSpPr/>
         <p:nvPr/>
       </p:nvGrpSpPr>
@@ -19316,7 +19264,7 @@
       </p:grpSpPr>
       <p:sp>
         <p:nvSpPr>
-          <p:cNvPr id="361" name="Google Shape;361;p46"/>
+          <p:cNvPr id="360" name="Google Shape;360;p46"/>
           <p:cNvSpPr txBox="1"/>
           <p:nvPr>
             <p:ph type="title"/>
@@ -19360,7 +19308,7 @@
       </p:sp>
       <p:sp>
         <p:nvSpPr>
-          <p:cNvPr id="362" name="Google Shape;362;p46"/>
+          <p:cNvPr id="361" name="Google Shape;361;p46"/>
           <p:cNvSpPr txBox="1"/>
           <p:nvPr>
             <p:ph idx="12" type="sldNum"/>
@@ -19400,7 +19348,7 @@
       </p:sp>
       <p:sp>
         <p:nvSpPr>
-          <p:cNvPr id="363" name="Google Shape;363;p46"/>
+          <p:cNvPr id="362" name="Google Shape;362;p46"/>
           <p:cNvSpPr txBox="1"/>
           <p:nvPr>
             <p:ph idx="1" type="body"/>
@@ -19551,7 +19499,7 @@
   <p:cSld>
     <p:spTree>
       <p:nvGrpSpPr>
-        <p:cNvPr id="367" name="Shape 367"/>
+        <p:cNvPr id="366" name="Shape 366"/>
         <p:cNvGrpSpPr/>
         <p:nvPr/>
       </p:nvGrpSpPr>
@@ -19565,7 +19513,7 @@
       </p:grpSpPr>
       <p:sp>
         <p:nvSpPr>
-          <p:cNvPr id="368" name="Google Shape;368;p47"/>
+          <p:cNvPr id="367" name="Google Shape;367;p47"/>
           <p:cNvSpPr txBox="1"/>
           <p:nvPr>
             <p:ph type="title"/>
@@ -19606,7 +19554,7 @@
       </p:sp>
       <p:sp>
         <p:nvSpPr>
-          <p:cNvPr id="369" name="Google Shape;369;p47"/>
+          <p:cNvPr id="368" name="Google Shape;368;p47"/>
           <p:cNvSpPr txBox="1"/>
           <p:nvPr>
             <p:ph idx="12" type="sldNum"/>
@@ -21542,6 +21490,285 @@
 </file>
 
 <file path=ppt/theme/theme1.xml><?xml version="1.0" encoding="utf-8"?>
+<a:theme xmlns:a="http://schemas.openxmlformats.org/drawingml/2006/main" xmlns:r="http://schemas.openxmlformats.org/officeDocument/2006/relationships" name="Streamline">
+  <a:themeElements>
+    <a:clrScheme name="Streamline">
+      <a:dk1>
+        <a:srgbClr val="B00136"/>
+      </a:dk1>
+      <a:lt1>
+        <a:srgbClr val="FFFFFF"/>
+      </a:lt1>
+      <a:dk2>
+        <a:srgbClr val="B00136"/>
+      </a:dk2>
+      <a:lt2>
+        <a:srgbClr val="FFFFFF"/>
+      </a:lt2>
+      <a:accent1>
+        <a:srgbClr val="3B3B3B"/>
+      </a:accent1>
+      <a:accent2>
+        <a:srgbClr val="FFFFFF"/>
+      </a:accent2>
+      <a:accent3>
+        <a:srgbClr val="3B3B3B"/>
+      </a:accent3>
+      <a:accent4>
+        <a:srgbClr val="000000"/>
+      </a:accent4>
+      <a:accent5>
+        <a:srgbClr val="FFFFFF"/>
+      </a:accent5>
+      <a:accent6>
+        <a:srgbClr val="948B8B"/>
+      </a:accent6>
+      <a:hlink>
+        <a:srgbClr val="000000"/>
+      </a:hlink>
+      <a:folHlink>
+        <a:srgbClr val="1C3678"/>
+      </a:folHlink>
+    </a:clrScheme>
+    <a:fontScheme name="Office">
+      <a:majorFont>
+        <a:latin typeface="Arial"/>
+        <a:ea typeface=""/>
+        <a:cs typeface=""/>
+        <a:font script="Jpan" typeface="ＭＳ Ｐゴシック"/>
+        <a:font script="Hang" typeface="맑은 고딕"/>
+        <a:font script="Hans" typeface="宋体"/>
+        <a:font script="Hant" typeface="新細明體"/>
+        <a:font script="Arab" typeface="Times New Roman"/>
+        <a:font script="Hebr" typeface="Times New Roman"/>
+        <a:font script="Thai" typeface="Angsana New"/>
+        <a:font script="Ethi" typeface="Nyala"/>
+        <a:font script="Beng" typeface="Vrinda"/>
+        <a:font script="Gujr" typeface="Shruti"/>
+        <a:font script="Khmr" typeface="MoolBoran"/>
+        <a:font script="Knda" typeface="Tunga"/>
+        <a:font script="Guru" typeface="Raavi"/>
+        <a:font script="Cans" typeface="Euphemia"/>
+        <a:font script="Cher" typeface="Plantagenet Cherokee"/>
+        <a:font script="Yiii" typeface="Microsoft Yi Baiti"/>
+        <a:font script="Tibt" typeface="Microsoft Himalaya"/>
+        <a:font script="Thaa" typeface="MV Boli"/>
+        <a:font script="Deva" typeface="Mangal"/>
+        <a:font script="Telu" typeface="Gautami"/>
+        <a:font script="Taml" typeface="Latha"/>
+        <a:font script="Syrc" typeface="Estrangelo Edessa"/>
+        <a:font script="Orya" typeface="Kalinga"/>
+        <a:font script="Mlym" typeface="Kartika"/>
+        <a:font script="Laoo" typeface="DokChampa"/>
+        <a:font script="Sinh" typeface="Iskoola Pota"/>
+        <a:font script="Mong" typeface="Mongolian Baiti"/>
+        <a:font script="Viet" typeface="Times New Roman"/>
+        <a:font script="Uigh" typeface="Microsoft Uighur"/>
+        <a:font script="Geor" typeface="Sylfaen"/>
+      </a:majorFont>
+      <a:minorFont>
+        <a:latin typeface="Arial"/>
+        <a:ea typeface=""/>
+        <a:cs typeface=""/>
+        <a:font script="Jpan" typeface="ＭＳ Ｐゴシック"/>
+        <a:font script="Hang" typeface="맑은 고딕"/>
+        <a:font script="Hans" typeface="宋体"/>
+        <a:font script="Hant" typeface="新細明體"/>
+        <a:font script="Arab" typeface="Arial"/>
+        <a:font script="Hebr" typeface="Arial"/>
+        <a:font script="Thai" typeface="Cordia New"/>
+        <a:font script="Ethi" typeface="Nyala"/>
+        <a:font script="Beng" typeface="Vrinda"/>
+        <a:font script="Gujr" typeface="Shruti"/>
+        <a:font script="Khmr" typeface="DaunPenh"/>
+        <a:font script="Knda" typeface="Tunga"/>
+        <a:font script="Guru" typeface="Raavi"/>
+        <a:font script="Cans" typeface="Euphemia"/>
+        <a:font script="Cher" typeface="Plantagenet Cherokee"/>
+        <a:font script="Yiii" typeface="Microsoft Yi Baiti"/>
+        <a:font script="Tibt" typeface="Microsoft Himalaya"/>
+        <a:font script="Thaa" typeface="MV Boli"/>
+        <a:font script="Deva" typeface="Mangal"/>
+        <a:font script="Telu" typeface="Gautami"/>
+        <a:font script="Taml" typeface="Latha"/>
+        <a:font script="Syrc" typeface="Estrangelo Edessa"/>
+        <a:font script="Orya" typeface="Kalinga"/>
+        <a:font script="Mlym" typeface="Kartika"/>
+        <a:font script="Laoo" typeface="DokChampa"/>
+        <a:font script="Sinh" typeface="Iskoola Pota"/>
+        <a:font script="Mong" typeface="Mongolian Baiti"/>
+        <a:font script="Viet" typeface="Arial"/>
+        <a:font script="Uigh" typeface="Microsoft Uighur"/>
+        <a:font script="Geor" typeface="Sylfaen"/>
+      </a:minorFont>
+    </a:fontScheme>
+    <a:fmtScheme name="Office">
+      <a:fillStyleLst>
+        <a:solidFill>
+          <a:schemeClr val="phClr"/>
+        </a:solidFill>
+        <a:gradFill rotWithShape="1">
+          <a:gsLst>
+            <a:gs pos="0">
+              <a:schemeClr val="phClr">
+                <a:tint val="50000"/>
+                <a:satMod val="300000"/>
+              </a:schemeClr>
+            </a:gs>
+            <a:gs pos="35000">
+              <a:schemeClr val="phClr">
+                <a:tint val="37000"/>
+                <a:satMod val="300000"/>
+              </a:schemeClr>
+            </a:gs>
+            <a:gs pos="100000">
+              <a:schemeClr val="phClr">
+                <a:tint val="15000"/>
+                <a:satMod val="350000"/>
+              </a:schemeClr>
+            </a:gs>
+          </a:gsLst>
+          <a:lin ang="16200000" scaled="1"/>
+        </a:gradFill>
+        <a:gradFill rotWithShape="1">
+          <a:gsLst>
+            <a:gs pos="0">
+              <a:schemeClr val="phClr">
+                <a:tint val="100000"/>
+                <a:shade val="100000"/>
+                <a:satMod val="130000"/>
+              </a:schemeClr>
+            </a:gs>
+            <a:gs pos="100000">
+              <a:schemeClr val="phClr">
+                <a:tint val="50000"/>
+                <a:shade val="100000"/>
+                <a:satMod val="350000"/>
+              </a:schemeClr>
+            </a:gs>
+          </a:gsLst>
+          <a:lin ang="16200000" scaled="0"/>
+        </a:gradFill>
+      </a:fillStyleLst>
+      <a:lnStyleLst>
+        <a:ln w="9525" cap="flat" cmpd="sng" algn="ctr">
+          <a:solidFill>
+            <a:schemeClr val="phClr">
+              <a:shade val="95000"/>
+              <a:satMod val="105000"/>
+            </a:schemeClr>
+          </a:solidFill>
+          <a:prstDash val="solid"/>
+        </a:ln>
+        <a:ln w="25400" cap="flat" cmpd="sng" algn="ctr">
+          <a:solidFill>
+            <a:schemeClr val="phClr"/>
+          </a:solidFill>
+          <a:prstDash val="solid"/>
+        </a:ln>
+        <a:ln w="38100" cap="flat" cmpd="sng" algn="ctr">
+          <a:solidFill>
+            <a:schemeClr val="phClr"/>
+          </a:solidFill>
+          <a:prstDash val="solid"/>
+        </a:ln>
+      </a:lnStyleLst>
+      <a:effectStyleLst>
+        <a:effectStyle>
+          <a:effectLst>
+            <a:outerShdw blurRad="40000" dist="20000" dir="5400000" rotWithShape="0">
+              <a:srgbClr val="000000">
+                <a:alpha val="38000"/>
+              </a:srgbClr>
+            </a:outerShdw>
+          </a:effectLst>
+        </a:effectStyle>
+        <a:effectStyle>
+          <a:effectLst>
+            <a:outerShdw blurRad="40000" dist="23000" dir="5400000" rotWithShape="0">
+              <a:srgbClr val="000000">
+                <a:alpha val="35000"/>
+              </a:srgbClr>
+            </a:outerShdw>
+          </a:effectLst>
+        </a:effectStyle>
+        <a:effectStyle>
+          <a:effectLst>
+            <a:outerShdw blurRad="40000" dist="23000" dir="5400000" rotWithShape="0">
+              <a:srgbClr val="000000">
+                <a:alpha val="35000"/>
+              </a:srgbClr>
+            </a:outerShdw>
+          </a:effectLst>
+          <a:scene3d>
+            <a:camera prst="orthographicFront">
+              <a:rot lat="0" lon="0" rev="0"/>
+            </a:camera>
+            <a:lightRig rig="threePt" dir="t">
+              <a:rot lat="0" lon="0" rev="1200000"/>
+            </a:lightRig>
+          </a:scene3d>
+          <a:sp3d>
+            <a:bevelT w="63500" h="25400"/>
+          </a:sp3d>
+        </a:effectStyle>
+      </a:effectStyleLst>
+      <a:bgFillStyleLst>
+        <a:solidFill>
+          <a:schemeClr val="phClr"/>
+        </a:solidFill>
+        <a:gradFill rotWithShape="1">
+          <a:gsLst>
+            <a:gs pos="0">
+              <a:schemeClr val="phClr">
+                <a:tint val="40000"/>
+                <a:satMod val="350000"/>
+              </a:schemeClr>
+            </a:gs>
+            <a:gs pos="40000">
+              <a:schemeClr val="phClr">
+                <a:tint val="45000"/>
+                <a:shade val="99000"/>
+                <a:satMod val="350000"/>
+              </a:schemeClr>
+            </a:gs>
+            <a:gs pos="100000">
+              <a:schemeClr val="phClr">
+                <a:shade val="20000"/>
+                <a:satMod val="255000"/>
+              </a:schemeClr>
+            </a:gs>
+          </a:gsLst>
+          <a:path path="circle">
+            <a:fillToRect l="50000" t="-80000" r="50000" b="180000"/>
+          </a:path>
+        </a:gradFill>
+        <a:gradFill rotWithShape="1">
+          <a:gsLst>
+            <a:gs pos="0">
+              <a:schemeClr val="phClr">
+                <a:tint val="80000"/>
+                <a:satMod val="300000"/>
+              </a:schemeClr>
+            </a:gs>
+            <a:gs pos="100000">
+              <a:schemeClr val="phClr">
+                <a:shade val="30000"/>
+                <a:satMod val="200000"/>
+              </a:schemeClr>
+            </a:gs>
+          </a:gsLst>
+          <a:path path="circle">
+            <a:fillToRect l="50000" t="50000" r="50000" b="50000"/>
+          </a:path>
+        </a:gradFill>
+      </a:bgFillStyleLst>
+    </a:fmtScheme>
+  </a:themeElements>
+</a:theme>
+</file>
+
+<file path=ppt/theme/theme2.xml><?xml version="1.0" encoding="utf-8"?>
 <a:theme xmlns:a="http://schemas.openxmlformats.org/drawingml/2006/main" xmlns:r="http://schemas.openxmlformats.org/officeDocument/2006/relationships">
   <a:themeElements>
     <a:clrScheme name="Default">
@@ -21818,283 +22045,4 @@
     </a:fmtScheme>
   </a:themeElements>
 </a:theme>
-</file>
-
-<file path=ppt/theme/theme2.xml><?xml version="1.0" encoding="utf-8"?>
-<a:theme xmlns:a="http://schemas.openxmlformats.org/drawingml/2006/main" xmlns:r="http://schemas.openxmlformats.org/officeDocument/2006/relationships" name="Streamline">
-  <a:themeElements>
-    <a:clrScheme name="Streamline">
-      <a:dk1>
-        <a:srgbClr val="B00136"/>
-      </a:dk1>
-      <a:lt1>
-        <a:srgbClr val="FFFFFF"/>
-      </a:lt1>
-      <a:dk2>
-        <a:srgbClr val="B00136"/>
-      </a:dk2>
-      <a:lt2>
-        <a:srgbClr val="FFFFFF"/>
-      </a:lt2>
-      <a:accent1>
-        <a:srgbClr val="3B3B3B"/>
-      </a:accent1>
-      <a:accent2>
-        <a:srgbClr val="FFFFFF"/>
-      </a:accent2>
-      <a:accent3>
-        <a:srgbClr val="3B3B3B"/>
-      </a:accent3>
-      <a:accent4>
-        <a:srgbClr val="000000"/>
-      </a:accent4>
-      <a:accent5>
-        <a:srgbClr val="FFFFFF"/>
-      </a:accent5>
-      <a:accent6>
-        <a:srgbClr val="948B8B"/>
-      </a:accent6>
-      <a:hlink>
-        <a:srgbClr val="000000"/>
-      </a:hlink>
-      <a:folHlink>
-        <a:srgbClr val="1C3678"/>
-      </a:folHlink>
-    </a:clrScheme>
-    <a:fontScheme name="Office">
-      <a:majorFont>
-        <a:latin typeface="Arial"/>
-        <a:ea typeface=""/>
-        <a:cs typeface=""/>
-        <a:font script="Jpan" typeface="ＭＳ Ｐゴシック"/>
-        <a:font script="Hang" typeface="맑은 고딕"/>
-        <a:font script="Hans" typeface="宋体"/>
-        <a:font script="Hant" typeface="新細明體"/>
-        <a:font script="Arab" typeface="Times New Roman"/>
-        <a:font script="Hebr" typeface="Times New Roman"/>
-        <a:font script="Thai" typeface="Angsana New"/>
-        <a:font script="Ethi" typeface="Nyala"/>
-        <a:font script="Beng" typeface="Vrinda"/>
-        <a:font script="Gujr" typeface="Shruti"/>
-        <a:font script="Khmr" typeface="MoolBoran"/>
-        <a:font script="Knda" typeface="Tunga"/>
-        <a:font script="Guru" typeface="Raavi"/>
-        <a:font script="Cans" typeface="Euphemia"/>
-        <a:font script="Cher" typeface="Plantagenet Cherokee"/>
-        <a:font script="Yiii" typeface="Microsoft Yi Baiti"/>
-        <a:font script="Tibt" typeface="Microsoft Himalaya"/>
-        <a:font script="Thaa" typeface="MV Boli"/>
-        <a:font script="Deva" typeface="Mangal"/>
-        <a:font script="Telu" typeface="Gautami"/>
-        <a:font script="Taml" typeface="Latha"/>
-        <a:font script="Syrc" typeface="Estrangelo Edessa"/>
-        <a:font script="Orya" typeface="Kalinga"/>
-        <a:font script="Mlym" typeface="Kartika"/>
-        <a:font script="Laoo" typeface="DokChampa"/>
-        <a:font script="Sinh" typeface="Iskoola Pota"/>
-        <a:font script="Mong" typeface="Mongolian Baiti"/>
-        <a:font script="Viet" typeface="Times New Roman"/>
-        <a:font script="Uigh" typeface="Microsoft Uighur"/>
-        <a:font script="Geor" typeface="Sylfaen"/>
-      </a:majorFont>
-      <a:minorFont>
-        <a:latin typeface="Arial"/>
-        <a:ea typeface=""/>
-        <a:cs typeface=""/>
-        <a:font script="Jpan" typeface="ＭＳ Ｐゴシック"/>
-        <a:font script="Hang" typeface="맑은 고딕"/>
-        <a:font script="Hans" typeface="宋体"/>
-        <a:font script="Hant" typeface="新細明體"/>
-        <a:font script="Arab" typeface="Arial"/>
-        <a:font script="Hebr" typeface="Arial"/>
-        <a:font script="Thai" typeface="Cordia New"/>
-        <a:font script="Ethi" typeface="Nyala"/>
-        <a:font script="Beng" typeface="Vrinda"/>
-        <a:font script="Gujr" typeface="Shruti"/>
-        <a:font script="Khmr" typeface="DaunPenh"/>
-        <a:font script="Knda" typeface="Tunga"/>
-        <a:font script="Guru" typeface="Raavi"/>
-        <a:font script="Cans" typeface="Euphemia"/>
-        <a:font script="Cher" typeface="Plantagenet Cherokee"/>
-        <a:font script="Yiii" typeface="Microsoft Yi Baiti"/>
-        <a:font script="Tibt" typeface="Microsoft Himalaya"/>
-        <a:font script="Thaa" typeface="MV Boli"/>
-        <a:font script="Deva" typeface="Mangal"/>
-        <a:font script="Telu" typeface="Gautami"/>
-        <a:font script="Taml" typeface="Latha"/>
-        <a:font script="Syrc" typeface="Estrangelo Edessa"/>
-        <a:font script="Orya" typeface="Kalinga"/>
-        <a:font script="Mlym" typeface="Kartika"/>
-        <a:font script="Laoo" typeface="DokChampa"/>
-        <a:font script="Sinh" typeface="Iskoola Pota"/>
-        <a:font script="Mong" typeface="Mongolian Baiti"/>
-        <a:font script="Viet" typeface="Arial"/>
-        <a:font script="Uigh" typeface="Microsoft Uighur"/>
-        <a:font script="Geor" typeface="Sylfaen"/>
-      </a:minorFont>
-    </a:fontScheme>
-    <a:fmtScheme name="Office">
-      <a:fillStyleLst>
-        <a:solidFill>
-          <a:schemeClr val="phClr"/>
-        </a:solidFill>
-        <a:gradFill rotWithShape="1">
-          <a:gsLst>
-            <a:gs pos="0">
-              <a:schemeClr val="phClr">
-                <a:tint val="50000"/>
-                <a:satMod val="300000"/>
-              </a:schemeClr>
-            </a:gs>
-            <a:gs pos="35000">
-              <a:schemeClr val="phClr">
-                <a:tint val="37000"/>
-                <a:satMod val="300000"/>
-              </a:schemeClr>
-            </a:gs>
-            <a:gs pos="100000">
-              <a:schemeClr val="phClr">
-                <a:tint val="15000"/>
-                <a:satMod val="350000"/>
-              </a:schemeClr>
-            </a:gs>
-          </a:gsLst>
-          <a:lin ang="16200000" scaled="1"/>
-        </a:gradFill>
-        <a:gradFill rotWithShape="1">
-          <a:gsLst>
-            <a:gs pos="0">
-              <a:schemeClr val="phClr">
-                <a:tint val="100000"/>
-                <a:shade val="100000"/>
-                <a:satMod val="130000"/>
-              </a:schemeClr>
-            </a:gs>
-            <a:gs pos="100000">
-              <a:schemeClr val="phClr">
-                <a:tint val="50000"/>
-                <a:shade val="100000"/>
-                <a:satMod val="350000"/>
-              </a:schemeClr>
-            </a:gs>
-          </a:gsLst>
-          <a:lin ang="16200000" scaled="0"/>
-        </a:gradFill>
-      </a:fillStyleLst>
-      <a:lnStyleLst>
-        <a:ln w="9525" cap="flat" cmpd="sng" algn="ctr">
-          <a:solidFill>
-            <a:schemeClr val="phClr">
-              <a:shade val="95000"/>
-              <a:satMod val="105000"/>
-            </a:schemeClr>
-          </a:solidFill>
-          <a:prstDash val="solid"/>
-        </a:ln>
-        <a:ln w="25400" cap="flat" cmpd="sng" algn="ctr">
-          <a:solidFill>
-            <a:schemeClr val="phClr"/>
-          </a:solidFill>
-          <a:prstDash val="solid"/>
-        </a:ln>
-        <a:ln w="38100" cap="flat" cmpd="sng" algn="ctr">
-          <a:solidFill>
-            <a:schemeClr val="phClr"/>
-          </a:solidFill>
-          <a:prstDash val="solid"/>
-        </a:ln>
-      </a:lnStyleLst>
-      <a:effectStyleLst>
-        <a:effectStyle>
-          <a:effectLst>
-            <a:outerShdw blurRad="40000" dist="20000" dir="5400000" rotWithShape="0">
-              <a:srgbClr val="000000">
-                <a:alpha val="38000"/>
-              </a:srgbClr>
-            </a:outerShdw>
-          </a:effectLst>
-        </a:effectStyle>
-        <a:effectStyle>
-          <a:effectLst>
-            <a:outerShdw blurRad="40000" dist="23000" dir="5400000" rotWithShape="0">
-              <a:srgbClr val="000000">
-                <a:alpha val="35000"/>
-              </a:srgbClr>
-            </a:outerShdw>
-          </a:effectLst>
-        </a:effectStyle>
-        <a:effectStyle>
-          <a:effectLst>
-            <a:outerShdw blurRad="40000" dist="23000" dir="5400000" rotWithShape="0">
-              <a:srgbClr val="000000">
-                <a:alpha val="35000"/>
-              </a:srgbClr>
-            </a:outerShdw>
-          </a:effectLst>
-          <a:scene3d>
-            <a:camera prst="orthographicFront">
-              <a:rot lat="0" lon="0" rev="0"/>
-            </a:camera>
-            <a:lightRig rig="threePt" dir="t">
-              <a:rot lat="0" lon="0" rev="1200000"/>
-            </a:lightRig>
-          </a:scene3d>
-          <a:sp3d>
-            <a:bevelT w="63500" h="25400"/>
-          </a:sp3d>
-        </a:effectStyle>
-      </a:effectStyleLst>
-      <a:bgFillStyleLst>
-        <a:solidFill>
-          <a:schemeClr val="phClr"/>
-        </a:solidFill>
-        <a:gradFill rotWithShape="1">
-          <a:gsLst>
-            <a:gs pos="0">
-              <a:schemeClr val="phClr">
-                <a:tint val="40000"/>
-                <a:satMod val="350000"/>
-              </a:schemeClr>
-            </a:gs>
-            <a:gs pos="40000">
-              <a:schemeClr val="phClr">
-                <a:tint val="45000"/>
-                <a:shade val="99000"/>
-                <a:satMod val="350000"/>
-              </a:schemeClr>
-            </a:gs>
-            <a:gs pos="100000">
-              <a:schemeClr val="phClr">
-                <a:shade val="20000"/>
-                <a:satMod val="255000"/>
-              </a:schemeClr>
-            </a:gs>
-          </a:gsLst>
-          <a:path path="circle">
-            <a:fillToRect l="50000" t="-80000" r="50000" b="180000"/>
-          </a:path>
-        </a:gradFill>
-        <a:gradFill rotWithShape="1">
-          <a:gsLst>
-            <a:gs pos="0">
-              <a:schemeClr val="phClr">
-                <a:tint val="80000"/>
-                <a:satMod val="300000"/>
-              </a:schemeClr>
-            </a:gs>
-            <a:gs pos="100000">
-              <a:schemeClr val="phClr">
-                <a:shade val="30000"/>
-                <a:satMod val="200000"/>
-              </a:schemeClr>
-            </a:gs>
-          </a:gsLst>
-          <a:path path="circle">
-            <a:fillToRect l="50000" t="50000" r="50000" b="50000"/>
-          </a:path>
-        </a:gradFill>
-      </a:bgFillStyleLst>
-    </a:fmtScheme>
-  </a:themeElements>
-</a:theme>
 </file>
</xml_diff>